<commit_message>
some update to slide happened?
</commit_message>
<xml_diff>
--- a/presentation/Using Ontology to Represent Data.pptx
+++ b/presentation/Using Ontology to Represent Data.pptx
@@ -142,6 +142,22 @@
       </a:defRPr>
     </a:lvl9pPr>
   </p:defaultTextStyle>
+  <p:extLst>
+    <p:ext uri="{EFAFB233-063F-42B5-8137-9DF3F51BA10A}">
+      <p15:sldGuideLst xmlns:p15="http://schemas.microsoft.com/office/powerpoint/2012/main">
+        <p15:guide id="1" orient="horz" pos="2160">
+          <p15:clr>
+            <a:srgbClr val="A4A3A4"/>
+          </p15:clr>
+        </p15:guide>
+        <p15:guide id="2" pos="2880">
+          <p15:clr>
+            <a:srgbClr val="A4A3A4"/>
+          </p15:clr>
+        </p15:guide>
+      </p15:sldGuideLst>
+    </p:ext>
+  </p:extLst>
 </p:presentation>
 </file>
 
@@ -227,7 +243,7 @@
           <a:p>
             <a:fld id="{377E136B-C3CB-9A49-8DCB-EBAEAE788D3B}" type="datetimeFigureOut">
               <a:rPr lang="en-US" smtClean="0"/>
-              <a:t>3/21/19</a:t>
+              <a:t>5/27/20</a:t>
             </a:fld>
             <a:endParaRPr lang="en-US"/>
           </a:p>
@@ -393,7 +409,7 @@
           <a:p>
             <a:fld id="{2B7DA987-9E1D-964E-AC3C-A6099D4C1527}" type="datetimeFigureOut">
               <a:rPr lang="en-US" smtClean="0"/>
-              <a:t>3/21/19</a:t>
+              <a:t>5/27/20</a:t>
             </a:fld>
             <a:endParaRPr lang="en-US"/>
           </a:p>
@@ -457,38 +473,37 @@
           <a:p>
             <a:pPr lvl="0"/>
             <a:r>
-              <a:rPr lang="en-US" smtClean="0"/>
+              <a:rPr lang="en-US"/>
               <a:t>Click to edit Master text styles</a:t>
             </a:r>
           </a:p>
           <a:p>
             <a:pPr lvl="1"/>
             <a:r>
-              <a:rPr lang="en-US" smtClean="0"/>
+              <a:rPr lang="en-US"/>
               <a:t>Second level</a:t>
             </a:r>
           </a:p>
           <a:p>
             <a:pPr lvl="2"/>
             <a:r>
-              <a:rPr lang="en-US" smtClean="0"/>
+              <a:rPr lang="en-US"/>
               <a:t>Third level</a:t>
             </a:r>
           </a:p>
           <a:p>
             <a:pPr lvl="3"/>
             <a:r>
-              <a:rPr lang="en-US" smtClean="0"/>
+              <a:rPr lang="en-US"/>
               <a:t>Fourth level</a:t>
             </a:r>
           </a:p>
           <a:p>
             <a:pPr lvl="4"/>
             <a:r>
-              <a:rPr lang="en-US" smtClean="0"/>
+              <a:rPr lang="en-US"/>
               <a:t>Fifth level</a:t>
             </a:r>
-            <a:endParaRPr lang="en-US"/>
           </a:p>
         </p:txBody>
       </p:sp>
@@ -784,10 +799,9 @@
           <a:lstStyle/>
           <a:p>
             <a:r>
-              <a:rPr lang="en-US" smtClean="0"/>
+              <a:rPr lang="en-US"/>
               <a:t>Click to edit Master title style</a:t>
             </a:r>
-            <a:endParaRPr lang="en-US"/>
           </a:p>
         </p:txBody>
       </p:sp>
@@ -903,10 +917,9 @@
           </a:lstStyle>
           <a:p>
             <a:r>
-              <a:rPr lang="en-US" smtClean="0"/>
+              <a:rPr lang="en-US"/>
               <a:t>Click to edit Master subtitle style</a:t>
             </a:r>
-            <a:endParaRPr lang="en-US"/>
           </a:p>
         </p:txBody>
       </p:sp>
@@ -927,7 +940,7 @@
           <a:p>
             <a:fld id="{FC6E6DC3-C70E-B246-949C-33C99997D196}" type="datetime1">
               <a:rPr lang="en-US" smtClean="0"/>
-              <a:t>3/21/19</a:t>
+              <a:t>5/27/20</a:t>
             </a:fld>
             <a:endParaRPr lang="en-US"/>
           </a:p>
@@ -1021,10 +1034,9 @@
           <a:lstStyle/>
           <a:p>
             <a:r>
-              <a:rPr lang="en-US" smtClean="0"/>
+              <a:rPr lang="en-US"/>
               <a:t>Click to edit Master title style</a:t>
             </a:r>
-            <a:endParaRPr lang="en-US"/>
           </a:p>
         </p:txBody>
       </p:sp>
@@ -1045,38 +1057,37 @@
           <a:p>
             <a:pPr lvl="0"/>
             <a:r>
-              <a:rPr lang="en-US" smtClean="0"/>
+              <a:rPr lang="en-US"/>
               <a:t>Click to edit Master text styles</a:t>
             </a:r>
           </a:p>
           <a:p>
             <a:pPr lvl="1"/>
             <a:r>
-              <a:rPr lang="en-US" smtClean="0"/>
+              <a:rPr lang="en-US"/>
               <a:t>Second level</a:t>
             </a:r>
           </a:p>
           <a:p>
             <a:pPr lvl="2"/>
             <a:r>
-              <a:rPr lang="en-US" smtClean="0"/>
+              <a:rPr lang="en-US"/>
               <a:t>Third level</a:t>
             </a:r>
           </a:p>
           <a:p>
             <a:pPr lvl="3"/>
             <a:r>
-              <a:rPr lang="en-US" smtClean="0"/>
+              <a:rPr lang="en-US"/>
               <a:t>Fourth level</a:t>
             </a:r>
           </a:p>
           <a:p>
             <a:pPr lvl="4"/>
             <a:r>
-              <a:rPr lang="en-US" smtClean="0"/>
+              <a:rPr lang="en-US"/>
               <a:t>Fifth level</a:t>
             </a:r>
-            <a:endParaRPr lang="en-US"/>
           </a:p>
         </p:txBody>
       </p:sp>
@@ -1097,7 +1108,7 @@
           <a:p>
             <a:fld id="{1303B78B-0B77-1E41-8826-444A962ABA69}" type="datetime1">
               <a:rPr lang="en-US" smtClean="0"/>
-              <a:t>3/21/19</a:t>
+              <a:t>5/27/20</a:t>
             </a:fld>
             <a:endParaRPr lang="en-US"/>
           </a:p>
@@ -1196,10 +1207,9 @@
           <a:lstStyle/>
           <a:p>
             <a:r>
-              <a:rPr lang="en-US" smtClean="0"/>
+              <a:rPr lang="en-US"/>
               <a:t>Click to edit Master title style</a:t>
             </a:r>
-            <a:endParaRPr lang="en-US"/>
           </a:p>
         </p:txBody>
       </p:sp>
@@ -1225,38 +1235,37 @@
           <a:p>
             <a:pPr lvl="0"/>
             <a:r>
-              <a:rPr lang="en-US" smtClean="0"/>
+              <a:rPr lang="en-US"/>
               <a:t>Click to edit Master text styles</a:t>
             </a:r>
           </a:p>
           <a:p>
             <a:pPr lvl="1"/>
             <a:r>
-              <a:rPr lang="en-US" smtClean="0"/>
+              <a:rPr lang="en-US"/>
               <a:t>Second level</a:t>
             </a:r>
           </a:p>
           <a:p>
             <a:pPr lvl="2"/>
             <a:r>
-              <a:rPr lang="en-US" smtClean="0"/>
+              <a:rPr lang="en-US"/>
               <a:t>Third level</a:t>
             </a:r>
           </a:p>
           <a:p>
             <a:pPr lvl="3"/>
             <a:r>
-              <a:rPr lang="en-US" smtClean="0"/>
+              <a:rPr lang="en-US"/>
               <a:t>Fourth level</a:t>
             </a:r>
           </a:p>
           <a:p>
             <a:pPr lvl="4"/>
             <a:r>
-              <a:rPr lang="en-US" smtClean="0"/>
+              <a:rPr lang="en-US"/>
               <a:t>Fifth level</a:t>
             </a:r>
-            <a:endParaRPr lang="en-US"/>
           </a:p>
         </p:txBody>
       </p:sp>
@@ -1277,7 +1286,7 @@
           <a:p>
             <a:fld id="{BD07C3C0-2E6B-8D4B-B9ED-8D5BA10D9FEB}" type="datetime1">
               <a:rPr lang="en-US" smtClean="0"/>
-              <a:t>3/21/19</a:t>
+              <a:t>5/27/20</a:t>
             </a:fld>
             <a:endParaRPr lang="en-US"/>
           </a:p>
@@ -1371,10 +1380,9 @@
           <a:lstStyle/>
           <a:p>
             <a:r>
-              <a:rPr lang="en-US" smtClean="0"/>
+              <a:rPr lang="en-US"/>
               <a:t>Click to edit Master title style</a:t>
             </a:r>
-            <a:endParaRPr lang="en-US"/>
           </a:p>
         </p:txBody>
       </p:sp>
@@ -1395,38 +1403,37 @@
           <a:p>
             <a:pPr lvl="0"/>
             <a:r>
-              <a:rPr lang="en-US" smtClean="0"/>
+              <a:rPr lang="en-US"/>
               <a:t>Click to edit Master text styles</a:t>
             </a:r>
           </a:p>
           <a:p>
             <a:pPr lvl="1"/>
             <a:r>
-              <a:rPr lang="en-US" smtClean="0"/>
+              <a:rPr lang="en-US"/>
               <a:t>Second level</a:t>
             </a:r>
           </a:p>
           <a:p>
             <a:pPr lvl="2"/>
             <a:r>
-              <a:rPr lang="en-US" smtClean="0"/>
+              <a:rPr lang="en-US"/>
               <a:t>Third level</a:t>
             </a:r>
           </a:p>
           <a:p>
             <a:pPr lvl="3"/>
             <a:r>
-              <a:rPr lang="en-US" smtClean="0"/>
+              <a:rPr lang="en-US"/>
               <a:t>Fourth level</a:t>
             </a:r>
           </a:p>
           <a:p>
             <a:pPr lvl="4"/>
             <a:r>
-              <a:rPr lang="en-US" smtClean="0"/>
+              <a:rPr lang="en-US"/>
               <a:t>Fifth level</a:t>
             </a:r>
-            <a:endParaRPr lang="en-US"/>
           </a:p>
         </p:txBody>
       </p:sp>
@@ -1447,7 +1454,7 @@
           <a:p>
             <a:fld id="{715E212F-E812-7E41-B636-114D79AC19CF}" type="datetime1">
               <a:rPr lang="en-US" smtClean="0"/>
-              <a:t>3/21/19</a:t>
+              <a:t>5/27/20</a:t>
             </a:fld>
             <a:endParaRPr lang="en-US"/>
           </a:p>
@@ -1550,10 +1557,9 @@
           </a:lstStyle>
           <a:p>
             <a:r>
-              <a:rPr lang="en-US" smtClean="0"/>
+              <a:rPr lang="en-US"/>
               <a:t>Click to edit Master title style</a:t>
             </a:r>
-            <a:endParaRPr lang="en-US"/>
           </a:p>
         </p:txBody>
       </p:sp>
@@ -1670,7 +1676,7 @@
           <a:p>
             <a:pPr lvl="0"/>
             <a:r>
-              <a:rPr lang="en-US" smtClean="0"/>
+              <a:rPr lang="en-US"/>
               <a:t>Click to edit Master text styles</a:t>
             </a:r>
           </a:p>
@@ -1693,7 +1699,7 @@
           <a:p>
             <a:fld id="{B9D5A663-D435-B84B-8C2D-93F800DF3BB9}" type="datetime1">
               <a:rPr lang="en-US" smtClean="0"/>
-              <a:t>3/21/19</a:t>
+              <a:t>5/27/20</a:t>
             </a:fld>
             <a:endParaRPr lang="en-US"/>
           </a:p>
@@ -1787,10 +1793,9 @@
           <a:lstStyle/>
           <a:p>
             <a:r>
-              <a:rPr lang="en-US" smtClean="0"/>
+              <a:rPr lang="en-US"/>
               <a:t>Click to edit Master title style</a:t>
             </a:r>
-            <a:endParaRPr lang="en-US"/>
           </a:p>
         </p:txBody>
       </p:sp>
@@ -1844,38 +1849,37 @@
           <a:p>
             <a:pPr lvl="0"/>
             <a:r>
-              <a:rPr lang="en-US" smtClean="0"/>
+              <a:rPr lang="en-US"/>
               <a:t>Click to edit Master text styles</a:t>
             </a:r>
           </a:p>
           <a:p>
             <a:pPr lvl="1"/>
             <a:r>
-              <a:rPr lang="en-US" smtClean="0"/>
+              <a:rPr lang="en-US"/>
               <a:t>Second level</a:t>
             </a:r>
           </a:p>
           <a:p>
             <a:pPr lvl="2"/>
             <a:r>
-              <a:rPr lang="en-US" smtClean="0"/>
+              <a:rPr lang="en-US"/>
               <a:t>Third level</a:t>
             </a:r>
           </a:p>
           <a:p>
             <a:pPr lvl="3"/>
             <a:r>
-              <a:rPr lang="en-US" smtClean="0"/>
+              <a:rPr lang="en-US"/>
               <a:t>Fourth level</a:t>
             </a:r>
           </a:p>
           <a:p>
             <a:pPr lvl="4"/>
             <a:r>
-              <a:rPr lang="en-US" smtClean="0"/>
+              <a:rPr lang="en-US"/>
               <a:t>Fifth level</a:t>
             </a:r>
-            <a:endParaRPr lang="en-US"/>
           </a:p>
         </p:txBody>
       </p:sp>
@@ -1929,38 +1933,37 @@
           <a:p>
             <a:pPr lvl="0"/>
             <a:r>
-              <a:rPr lang="en-US" smtClean="0"/>
+              <a:rPr lang="en-US"/>
               <a:t>Click to edit Master text styles</a:t>
             </a:r>
           </a:p>
           <a:p>
             <a:pPr lvl="1"/>
             <a:r>
-              <a:rPr lang="en-US" smtClean="0"/>
+              <a:rPr lang="en-US"/>
               <a:t>Second level</a:t>
             </a:r>
           </a:p>
           <a:p>
             <a:pPr lvl="2"/>
             <a:r>
-              <a:rPr lang="en-US" smtClean="0"/>
+              <a:rPr lang="en-US"/>
               <a:t>Third level</a:t>
             </a:r>
           </a:p>
           <a:p>
             <a:pPr lvl="3"/>
             <a:r>
-              <a:rPr lang="en-US" smtClean="0"/>
+              <a:rPr lang="en-US"/>
               <a:t>Fourth level</a:t>
             </a:r>
           </a:p>
           <a:p>
             <a:pPr lvl="4"/>
             <a:r>
-              <a:rPr lang="en-US" smtClean="0"/>
+              <a:rPr lang="en-US"/>
               <a:t>Fifth level</a:t>
             </a:r>
-            <a:endParaRPr lang="en-US"/>
           </a:p>
         </p:txBody>
       </p:sp>
@@ -1981,7 +1984,7 @@
           <a:p>
             <a:fld id="{DE94A9F4-B19F-F643-BDBD-2A04BD185309}" type="datetime1">
               <a:rPr lang="en-US" smtClean="0"/>
-              <a:t>3/21/19</a:t>
+              <a:t>5/27/20</a:t>
             </a:fld>
             <a:endParaRPr lang="en-US"/>
           </a:p>
@@ -2079,10 +2082,9 @@
           </a:lstStyle>
           <a:p>
             <a:r>
-              <a:rPr lang="en-US" smtClean="0"/>
+              <a:rPr lang="en-US"/>
               <a:t>Click to edit Master title style</a:t>
             </a:r>
-            <a:endParaRPr lang="en-US"/>
           </a:p>
         </p:txBody>
       </p:sp>
@@ -2145,7 +2147,7 @@
           <a:p>
             <a:pPr lvl="0"/>
             <a:r>
-              <a:rPr lang="en-US" smtClean="0"/>
+              <a:rPr lang="en-US"/>
               <a:t>Click to edit Master text styles</a:t>
             </a:r>
           </a:p>
@@ -2201,38 +2203,37 @@
           <a:p>
             <a:pPr lvl="0"/>
             <a:r>
-              <a:rPr lang="en-US" smtClean="0"/>
+              <a:rPr lang="en-US"/>
               <a:t>Click to edit Master text styles</a:t>
             </a:r>
           </a:p>
           <a:p>
             <a:pPr lvl="1"/>
             <a:r>
-              <a:rPr lang="en-US" smtClean="0"/>
+              <a:rPr lang="en-US"/>
               <a:t>Second level</a:t>
             </a:r>
           </a:p>
           <a:p>
             <a:pPr lvl="2"/>
             <a:r>
-              <a:rPr lang="en-US" smtClean="0"/>
+              <a:rPr lang="en-US"/>
               <a:t>Third level</a:t>
             </a:r>
           </a:p>
           <a:p>
             <a:pPr lvl="3"/>
             <a:r>
-              <a:rPr lang="en-US" smtClean="0"/>
+              <a:rPr lang="en-US"/>
               <a:t>Fourth level</a:t>
             </a:r>
           </a:p>
           <a:p>
             <a:pPr lvl="4"/>
             <a:r>
-              <a:rPr lang="en-US" smtClean="0"/>
+              <a:rPr lang="en-US"/>
               <a:t>Fifth level</a:t>
             </a:r>
-            <a:endParaRPr lang="en-US"/>
           </a:p>
         </p:txBody>
       </p:sp>
@@ -2295,7 +2296,7 @@
           <a:p>
             <a:pPr lvl="0"/>
             <a:r>
-              <a:rPr lang="en-US" smtClean="0"/>
+              <a:rPr lang="en-US"/>
               <a:t>Click to edit Master text styles</a:t>
             </a:r>
           </a:p>
@@ -2351,38 +2352,37 @@
           <a:p>
             <a:pPr lvl="0"/>
             <a:r>
-              <a:rPr lang="en-US" smtClean="0"/>
+              <a:rPr lang="en-US"/>
               <a:t>Click to edit Master text styles</a:t>
             </a:r>
           </a:p>
           <a:p>
             <a:pPr lvl="1"/>
             <a:r>
-              <a:rPr lang="en-US" smtClean="0"/>
+              <a:rPr lang="en-US"/>
               <a:t>Second level</a:t>
             </a:r>
           </a:p>
           <a:p>
             <a:pPr lvl="2"/>
             <a:r>
-              <a:rPr lang="en-US" smtClean="0"/>
+              <a:rPr lang="en-US"/>
               <a:t>Third level</a:t>
             </a:r>
           </a:p>
           <a:p>
             <a:pPr lvl="3"/>
             <a:r>
-              <a:rPr lang="en-US" smtClean="0"/>
+              <a:rPr lang="en-US"/>
               <a:t>Fourth level</a:t>
             </a:r>
           </a:p>
           <a:p>
             <a:pPr lvl="4"/>
             <a:r>
-              <a:rPr lang="en-US" smtClean="0"/>
+              <a:rPr lang="en-US"/>
               <a:t>Fifth level</a:t>
             </a:r>
-            <a:endParaRPr lang="en-US"/>
           </a:p>
         </p:txBody>
       </p:sp>
@@ -2403,7 +2403,7 @@
           <a:p>
             <a:fld id="{13EFC094-AC9A-324B-BE07-643D24B60D17}" type="datetime1">
               <a:rPr lang="en-US" smtClean="0"/>
-              <a:t>3/21/19</a:t>
+              <a:t>5/27/20</a:t>
             </a:fld>
             <a:endParaRPr lang="en-US"/>
           </a:p>
@@ -2497,10 +2497,9 @@
           <a:lstStyle/>
           <a:p>
             <a:r>
-              <a:rPr lang="en-US" smtClean="0"/>
+              <a:rPr lang="en-US"/>
               <a:t>Click to edit Master title style</a:t>
             </a:r>
-            <a:endParaRPr lang="en-US"/>
           </a:p>
         </p:txBody>
       </p:sp>
@@ -2521,7 +2520,7 @@
           <a:p>
             <a:fld id="{2E67D1D7-D6E8-DF44-A4F9-AD88438A5559}" type="datetime1">
               <a:rPr lang="en-US" smtClean="0"/>
-              <a:t>3/21/19</a:t>
+              <a:t>5/27/20</a:t>
             </a:fld>
             <a:endParaRPr lang="en-US"/>
           </a:p>
@@ -2616,7 +2615,7 @@
           <a:p>
             <a:fld id="{5252AB08-8CF0-374C-A113-840992A6B44A}" type="datetime1">
               <a:rPr lang="en-US" smtClean="0"/>
-              <a:t>3/21/19</a:t>
+              <a:t>5/27/20</a:t>
             </a:fld>
             <a:endParaRPr lang="en-US"/>
           </a:p>
@@ -2719,10 +2718,9 @@
           </a:lstStyle>
           <a:p>
             <a:r>
-              <a:rPr lang="en-US" smtClean="0"/>
+              <a:rPr lang="en-US"/>
               <a:t>Click to edit Master title style</a:t>
             </a:r>
-            <a:endParaRPr lang="en-US"/>
           </a:p>
         </p:txBody>
       </p:sp>
@@ -2776,38 +2774,37 @@
           <a:p>
             <a:pPr lvl="0"/>
             <a:r>
-              <a:rPr lang="en-US" smtClean="0"/>
+              <a:rPr lang="en-US"/>
               <a:t>Click to edit Master text styles</a:t>
             </a:r>
           </a:p>
           <a:p>
             <a:pPr lvl="1"/>
             <a:r>
-              <a:rPr lang="en-US" smtClean="0"/>
+              <a:rPr lang="en-US"/>
               <a:t>Second level</a:t>
             </a:r>
           </a:p>
           <a:p>
             <a:pPr lvl="2"/>
             <a:r>
-              <a:rPr lang="en-US" smtClean="0"/>
+              <a:rPr lang="en-US"/>
               <a:t>Third level</a:t>
             </a:r>
           </a:p>
           <a:p>
             <a:pPr lvl="3"/>
             <a:r>
-              <a:rPr lang="en-US" smtClean="0"/>
+              <a:rPr lang="en-US"/>
               <a:t>Fourth level</a:t>
             </a:r>
           </a:p>
           <a:p>
             <a:pPr lvl="4"/>
             <a:r>
-              <a:rPr lang="en-US" smtClean="0"/>
+              <a:rPr lang="en-US"/>
               <a:t>Fifth level</a:t>
             </a:r>
-            <a:endParaRPr lang="en-US"/>
           </a:p>
         </p:txBody>
       </p:sp>
@@ -2870,7 +2867,7 @@
           <a:p>
             <a:pPr lvl="0"/>
             <a:r>
-              <a:rPr lang="en-US" smtClean="0"/>
+              <a:rPr lang="en-US"/>
               <a:t>Click to edit Master text styles</a:t>
             </a:r>
           </a:p>
@@ -2893,7 +2890,7 @@
           <a:p>
             <a:fld id="{B7D08E4C-86EB-AD4E-A767-688D95C387C5}" type="datetime1">
               <a:rPr lang="en-US" smtClean="0"/>
-              <a:t>3/21/19</a:t>
+              <a:t>5/27/20</a:t>
             </a:fld>
             <a:endParaRPr lang="en-US"/>
           </a:p>
@@ -2996,10 +2993,9 @@
           </a:lstStyle>
           <a:p>
             <a:r>
-              <a:rPr lang="en-US" smtClean="0"/>
+              <a:rPr lang="en-US"/>
               <a:t>Click to edit Master title style</a:t>
             </a:r>
-            <a:endParaRPr lang="en-US"/>
           </a:p>
         </p:txBody>
       </p:sp>
@@ -3123,7 +3119,7 @@
           <a:p>
             <a:pPr lvl="0"/>
             <a:r>
-              <a:rPr lang="en-US" smtClean="0"/>
+              <a:rPr lang="en-US"/>
               <a:t>Click to edit Master text styles</a:t>
             </a:r>
           </a:p>
@@ -3146,7 +3142,7 @@
           <a:p>
             <a:fld id="{75D97673-4AA9-404D-A718-0BAB9EA4ECE6}" type="datetime1">
               <a:rPr lang="en-US" smtClean="0"/>
-              <a:t>3/21/19</a:t>
+              <a:t>5/27/20</a:t>
             </a:fld>
             <a:endParaRPr lang="en-US"/>
           </a:p>
@@ -3255,10 +3251,9 @@
           <a:lstStyle/>
           <a:p>
             <a:r>
-              <a:rPr lang="en-US" smtClean="0"/>
+              <a:rPr lang="en-US"/>
               <a:t>Click to edit Master title style</a:t>
             </a:r>
-            <a:endParaRPr lang="en-US"/>
           </a:p>
         </p:txBody>
       </p:sp>
@@ -3289,38 +3284,37 @@
           <a:p>
             <a:pPr lvl="0"/>
             <a:r>
-              <a:rPr lang="en-US" smtClean="0"/>
+              <a:rPr lang="en-US"/>
               <a:t>Click to edit Master text styles</a:t>
             </a:r>
           </a:p>
           <a:p>
             <a:pPr lvl="1"/>
             <a:r>
-              <a:rPr lang="en-US" smtClean="0"/>
+              <a:rPr lang="en-US"/>
               <a:t>Second level</a:t>
             </a:r>
           </a:p>
           <a:p>
             <a:pPr lvl="2"/>
             <a:r>
-              <a:rPr lang="en-US" smtClean="0"/>
+              <a:rPr lang="en-US"/>
               <a:t>Third level</a:t>
             </a:r>
           </a:p>
           <a:p>
             <a:pPr lvl="3"/>
             <a:r>
-              <a:rPr lang="en-US" smtClean="0"/>
+              <a:rPr lang="en-US"/>
               <a:t>Fourth level</a:t>
             </a:r>
           </a:p>
           <a:p>
             <a:pPr lvl="4"/>
             <a:r>
-              <a:rPr lang="en-US" smtClean="0"/>
+              <a:rPr lang="en-US"/>
               <a:t>Fifth level</a:t>
             </a:r>
-            <a:endParaRPr lang="en-US"/>
           </a:p>
         </p:txBody>
       </p:sp>
@@ -3359,7 +3353,7 @@
           <a:p>
             <a:fld id="{AE9F8E04-759C-A844-A269-45D932D27EA4}" type="datetime1">
               <a:rPr lang="en-US" smtClean="0"/>
-              <a:t>3/21/19</a:t>
+              <a:t>5/27/20</a:t>
             </a:fld>
             <a:endParaRPr lang="en-US"/>
           </a:p>
@@ -3756,10 +3750,9 @@
           <a:lstStyle/>
           <a:p>
             <a:r>
-              <a:rPr lang="en-US" dirty="0" smtClean="0"/>
+              <a:rPr lang="en-US" dirty="0"/>
               <a:t>Using Ontology to Represent Data</a:t>
             </a:r>
-            <a:endParaRPr lang="en-US" dirty="0"/>
           </a:p>
         </p:txBody>
       </p:sp>
@@ -3779,10 +3772,9 @@
           <a:lstStyle/>
           <a:p>
             <a:r>
-              <a:rPr lang="en-US" dirty="0" smtClean="0"/>
+              <a:rPr lang="en-US" dirty="0"/>
               <a:t>William Duncan</a:t>
             </a:r>
-            <a:endParaRPr lang="en-US" dirty="0"/>
           </a:p>
         </p:txBody>
       </p:sp>
@@ -3855,10 +3847,9 @@
           <a:lstStyle/>
           <a:p>
             <a:r>
-              <a:rPr lang="en-US" dirty="0" smtClean="0"/>
+              <a:rPr lang="en-US" dirty="0"/>
               <a:t>Data as Graph - Semantics</a:t>
             </a:r>
-            <a:endParaRPr lang="en-US" dirty="0"/>
           </a:p>
         </p:txBody>
       </p:sp>
@@ -3991,10 +3982,9 @@
           <a:lstStyle/>
           <a:p>
             <a:r>
-              <a:rPr lang="en-US" dirty="0" smtClean="0"/>
+              <a:rPr lang="en-US" dirty="0"/>
               <a:t>Data as Graph - Semantics</a:t>
             </a:r>
-            <a:endParaRPr lang="en-US" dirty="0"/>
           </a:p>
         </p:txBody>
       </p:sp>
@@ -4097,10 +4087,9 @@
           <a:lstStyle/>
           <a:p>
             <a:r>
-              <a:rPr lang="en-US" dirty="0" smtClean="0"/>
+              <a:rPr lang="en-US" dirty="0"/>
               <a:t>Data as Graph - Semantics</a:t>
             </a:r>
-            <a:endParaRPr lang="en-US" dirty="0"/>
           </a:p>
         </p:txBody>
       </p:sp>
@@ -4191,7 +4180,7 @@
               <a:buChar char="•"/>
             </a:pPr>
             <a:r>
-              <a:rPr lang="en-US" sz="2800" b="1" dirty="0" smtClean="0"/>
+              <a:rPr lang="en-US" sz="2800" b="1" dirty="0"/>
               <a:t>Sex fields with value “Male” represent male genders</a:t>
             </a:r>
           </a:p>
@@ -4201,7 +4190,7 @@
               <a:buChar char="•"/>
             </a:pPr>
             <a:r>
-              <a:rPr lang="en-US" sz="2800" b="1" dirty="0" smtClean="0"/>
+              <a:rPr lang="en-US" sz="2800" b="1" dirty="0"/>
               <a:t>Gender fields with value “M” represent male genders</a:t>
             </a:r>
           </a:p>
@@ -4283,10 +4272,9 @@
           <a:lstStyle/>
           <a:p>
             <a:r>
-              <a:rPr lang="en-US" dirty="0" smtClean="0"/>
+              <a:rPr lang="en-US" dirty="0"/>
               <a:t>Data as Graph - Semantics</a:t>
             </a:r>
-            <a:endParaRPr lang="en-US" dirty="0"/>
           </a:p>
         </p:txBody>
       </p:sp>
@@ -4449,10 +4437,9 @@
           <a:lstStyle/>
           <a:p>
             <a:r>
-              <a:rPr lang="en-US" dirty="0" smtClean="0"/>
+              <a:rPr lang="en-US" dirty="0"/>
               <a:t>Data as Graph - Semantics</a:t>
             </a:r>
-            <a:endParaRPr lang="en-US" dirty="0"/>
           </a:p>
         </p:txBody>
       </p:sp>
@@ -4508,7 +4495,7 @@
           </a:bodyPr>
           <a:lstStyle/>
           <a:p>
-            <a:endParaRPr lang="en-US" sz="2600" b="1" dirty="0" smtClean="0"/>
+            <a:endParaRPr lang="en-US" sz="2600" b="1" dirty="0"/>
           </a:p>
           <a:p>
             <a:pPr marL="285750" indent="-285750">
@@ -4516,7 +4503,7 @@
               <a:buChar char="•"/>
             </a:pPr>
             <a:r>
-              <a:rPr lang="en-US" sz="2600" b="1" dirty="0" smtClean="0"/>
+              <a:rPr lang="en-US" sz="2600" b="1" dirty="0"/>
               <a:t>Fields that represent patients and</a:t>
             </a:r>
           </a:p>
@@ -4526,7 +4513,7 @@
               <a:buChar char="•"/>
             </a:pPr>
             <a:r>
-              <a:rPr lang="en-US" sz="2600" b="1" dirty="0" smtClean="0"/>
+              <a:rPr lang="en-US" sz="2600" b="1" dirty="0"/>
               <a:t>Are members of records that have a field which represents male genders</a:t>
             </a:r>
           </a:p>
@@ -4536,7 +4523,7 @@
               <a:buChar char="•"/>
             </a:pPr>
             <a:r>
-              <a:rPr lang="en-US" sz="2600" b="1" dirty="0" smtClean="0"/>
+              <a:rPr lang="en-US" sz="2600" b="1" dirty="0"/>
               <a:t>Represent male patients</a:t>
             </a:r>
           </a:p>
@@ -4623,10 +4610,9 @@
           <a:lstStyle/>
           <a:p>
             <a:r>
-              <a:rPr lang="en-US" dirty="0" smtClean="0"/>
+              <a:rPr lang="en-US" dirty="0"/>
               <a:t>Data as Graph - SPARQL</a:t>
             </a:r>
-            <a:endParaRPr lang="en-US" dirty="0"/>
           </a:p>
         </p:txBody>
       </p:sp>
@@ -4651,10 +4637,9 @@
           <a:lstStyle/>
           <a:p>
             <a:r>
-              <a:rPr lang="en-US" dirty="0" smtClean="0"/>
+              <a:rPr lang="en-US" dirty="0"/>
               <a:t>Queries can have an SQL feel</a:t>
             </a:r>
-            <a:endParaRPr lang="en-US" dirty="0"/>
           </a:p>
         </p:txBody>
       </p:sp>
@@ -4792,10 +4777,9 @@
           <a:lstStyle/>
           <a:p>
             <a:r>
-              <a:rPr lang="en-US" dirty="0" smtClean="0"/>
+              <a:rPr lang="en-US" dirty="0"/>
               <a:t>Data as Graph - SPARQL</a:t>
             </a:r>
-            <a:endParaRPr lang="en-US" dirty="0"/>
           </a:p>
         </p:txBody>
       </p:sp>
@@ -4820,10 +4804,9 @@
           <a:lstStyle/>
           <a:p>
             <a:r>
-              <a:rPr lang="en-US" dirty="0" smtClean="0"/>
+              <a:rPr lang="en-US" dirty="0"/>
               <a:t>Join across patients_1 and services_1 tables</a:t>
             </a:r>
-            <a:endParaRPr lang="en-US" dirty="0"/>
           </a:p>
         </p:txBody>
       </p:sp>
@@ -4961,10 +4944,9 @@
           <a:lstStyle/>
           <a:p>
             <a:r>
-              <a:rPr lang="en-US" dirty="0" smtClean="0"/>
+              <a:rPr lang="en-US" dirty="0"/>
               <a:t>Data as Graph - SPARQL</a:t>
             </a:r>
-            <a:endParaRPr lang="en-US" dirty="0"/>
           </a:p>
         </p:txBody>
       </p:sp>
@@ -4989,10 +4971,9 @@
           <a:lstStyle/>
           <a:p>
             <a:r>
-              <a:rPr lang="en-US" dirty="0" smtClean="0"/>
+              <a:rPr lang="en-US" dirty="0"/>
               <a:t>Find all fields that represent female genders</a:t>
             </a:r>
-            <a:endParaRPr lang="en-US" dirty="0"/>
           </a:p>
         </p:txBody>
       </p:sp>
@@ -5155,10 +5136,9 @@
           <a:lstStyle/>
           <a:p>
             <a:r>
-              <a:rPr lang="en-US" dirty="0" smtClean="0"/>
+              <a:rPr lang="en-US" dirty="0"/>
               <a:t>Data Specifications</a:t>
             </a:r>
-            <a:endParaRPr lang="en-US" dirty="0"/>
           </a:p>
         </p:txBody>
       </p:sp>
@@ -5261,10 +5241,9 @@
           <a:lstStyle/>
           <a:p>
             <a:r>
-              <a:rPr lang="en-US" dirty="0" smtClean="0"/>
+              <a:rPr lang="en-US" dirty="0"/>
               <a:t>Data Specifications</a:t>
             </a:r>
-            <a:endParaRPr lang="en-US" dirty="0"/>
           </a:p>
         </p:txBody>
       </p:sp>
@@ -5367,10 +5346,9 @@
           <a:lstStyle/>
           <a:p>
             <a:r>
-              <a:rPr lang="en-US" dirty="0" smtClean="0"/>
+              <a:rPr lang="en-US" dirty="0"/>
               <a:t>Themes</a:t>
             </a:r>
-            <a:endParaRPr lang="en-US" dirty="0"/>
           </a:p>
         </p:txBody>
       </p:sp>
@@ -5390,41 +5368,41 @@
           <a:lstStyle/>
           <a:p>
             <a:r>
-              <a:rPr lang="en-US" dirty="0" smtClean="0"/>
+              <a:rPr lang="en-US" dirty="0"/>
               <a:t>Data integration issues</a:t>
             </a:r>
           </a:p>
           <a:p>
             <a:r>
-              <a:rPr lang="en-US" dirty="0" smtClean="0"/>
+              <a:rPr lang="en-US" dirty="0"/>
               <a:t>Data as a graph</a:t>
             </a:r>
           </a:p>
           <a:p>
             <a:r>
-              <a:rPr lang="en-US" dirty="0" smtClean="0"/>
+              <a:rPr lang="en-US" dirty="0"/>
               <a:t>Leveraging semantics</a:t>
             </a:r>
           </a:p>
           <a:p>
             <a:r>
-              <a:rPr lang="en-US" dirty="0" err="1" smtClean="0"/>
+              <a:rPr lang="en-US" dirty="0" err="1"/>
               <a:t>Triplestores</a:t>
             </a:r>
             <a:r>
-              <a:rPr lang="en-US" dirty="0" smtClean="0"/>
+              <a:rPr lang="en-US" dirty="0"/>
               <a:t> and SPARQL</a:t>
             </a:r>
           </a:p>
           <a:p>
             <a:r>
-              <a:rPr lang="en-US" dirty="0" smtClean="0"/>
+              <a:rPr lang="en-US" dirty="0"/>
               <a:t>Data Specifications</a:t>
             </a:r>
           </a:p>
           <a:p>
             <a:r>
-              <a:rPr lang="en-US" dirty="0" smtClean="0"/>
+              <a:rPr lang="en-US" dirty="0"/>
               <a:t>Data wrangling</a:t>
             </a:r>
           </a:p>
@@ -5507,10 +5485,9 @@
           <a:lstStyle/>
           <a:p>
             <a:r>
-              <a:rPr lang="en-US" dirty="0" smtClean="0"/>
+              <a:rPr lang="en-US" dirty="0"/>
               <a:t>Data Specifications - SPARQL</a:t>
             </a:r>
-            <a:endParaRPr lang="en-US" dirty="0"/>
           </a:p>
         </p:txBody>
       </p:sp>
@@ -5537,10 +5514,9 @@
           <a:lstStyle/>
           <a:p>
             <a:r>
-              <a:rPr lang="en-US" sz="2800" dirty="0" smtClean="0"/>
+              <a:rPr lang="en-US" sz="2800" dirty="0"/>
               <a:t>Find all fields that match data specifications with semantic value that represents genders</a:t>
             </a:r>
-            <a:endParaRPr lang="en-US" sz="2800" dirty="0"/>
           </a:p>
         </p:txBody>
       </p:sp>
@@ -5643,10 +5619,9 @@
           <a:lstStyle/>
           <a:p>
             <a:r>
-              <a:rPr lang="en-US" dirty="0" smtClean="0"/>
+              <a:rPr lang="en-US" dirty="0"/>
               <a:t>Data Specifications - SPARQL</a:t>
             </a:r>
-            <a:endParaRPr lang="en-US" dirty="0"/>
           </a:p>
         </p:txBody>
       </p:sp>
@@ -5839,18 +5814,17 @@
           <a:lstStyle/>
           <a:p>
             <a:r>
-              <a:rPr lang="en-US" dirty="0" smtClean="0"/>
+              <a:rPr lang="en-US" dirty="0"/>
               <a:t>SPARQL </a:t>
             </a:r>
             <a:r>
-              <a:rPr lang="mr-IN" dirty="0" smtClean="0"/>
+              <a:rPr lang="mr-IN" dirty="0"/>
               <a:t>–</a:t>
             </a:r>
             <a:r>
-              <a:rPr lang="en-US" dirty="0" smtClean="0"/>
+              <a:rPr lang="en-US" dirty="0"/>
               <a:t> Data Wrangling</a:t>
             </a:r>
-            <a:endParaRPr lang="en-US" dirty="0"/>
           </a:p>
         </p:txBody>
       </p:sp>
@@ -5875,10 +5849,9 @@
           <a:lstStyle/>
           <a:p>
             <a:r>
-              <a:rPr lang="en-US" dirty="0" smtClean="0"/>
+              <a:rPr lang="en-US" dirty="0"/>
               <a:t>Return records in tabular structure</a:t>
             </a:r>
-            <a:endParaRPr lang="en-US" dirty="0"/>
           </a:p>
         </p:txBody>
       </p:sp>
@@ -6016,18 +5989,17 @@
           <a:lstStyle/>
           <a:p>
             <a:r>
-              <a:rPr lang="en-US" dirty="0" smtClean="0"/>
+              <a:rPr lang="en-US" dirty="0"/>
               <a:t>SPARQL </a:t>
             </a:r>
             <a:r>
-              <a:rPr lang="mr-IN" dirty="0" smtClean="0"/>
+              <a:rPr lang="mr-IN" dirty="0"/>
               <a:t>–</a:t>
             </a:r>
             <a:r>
-              <a:rPr lang="en-US" dirty="0" smtClean="0"/>
+              <a:rPr lang="en-US" dirty="0"/>
               <a:t> Data Wrangling</a:t>
             </a:r>
-            <a:endParaRPr lang="en-US" dirty="0"/>
           </a:p>
         </p:txBody>
       </p:sp>
@@ -6052,10 +6024,9 @@
           <a:lstStyle/>
           <a:p>
             <a:r>
-              <a:rPr lang="en-US" dirty="0" smtClean="0"/>
+              <a:rPr lang="en-US" dirty="0"/>
               <a:t>Return records in EAV structure</a:t>
             </a:r>
-            <a:endParaRPr lang="en-US" dirty="0"/>
           </a:p>
         </p:txBody>
       </p:sp>
@@ -6158,18 +6129,17 @@
           <a:lstStyle/>
           <a:p>
             <a:r>
-              <a:rPr lang="en-US" dirty="0" smtClean="0"/>
+              <a:rPr lang="en-US" dirty="0"/>
               <a:t>SPARQL </a:t>
             </a:r>
             <a:r>
-              <a:rPr lang="mr-IN" dirty="0" smtClean="0"/>
+              <a:rPr lang="mr-IN" dirty="0"/>
               <a:t>–</a:t>
             </a:r>
             <a:r>
-              <a:rPr lang="en-US" dirty="0" smtClean="0"/>
+              <a:rPr lang="en-US" dirty="0"/>
               <a:t> Data Wrangling</a:t>
             </a:r>
-            <a:endParaRPr lang="en-US" dirty="0"/>
           </a:p>
         </p:txBody>
       </p:sp>
@@ -6272,10 +6242,9 @@
           <a:lstStyle/>
           <a:p>
             <a:r>
-              <a:rPr lang="en-US" dirty="0" smtClean="0"/>
+              <a:rPr lang="en-US" dirty="0"/>
               <a:t>FAIR Data</a:t>
             </a:r>
-            <a:endParaRPr lang="en-US" dirty="0"/>
           </a:p>
         </p:txBody>
       </p:sp>
@@ -6300,51 +6269,51 @@
           <a:lstStyle/>
           <a:p>
             <a:r>
-              <a:rPr lang="en-US" dirty="0" smtClean="0"/>
+              <a:rPr lang="en-US" dirty="0"/>
               <a:t>Data is </a:t>
             </a:r>
           </a:p>
           <a:p>
             <a:pPr lvl="1"/>
             <a:r>
-              <a:rPr lang="en-US" b="1" dirty="0" smtClean="0"/>
+              <a:rPr lang="en-US" b="1" dirty="0"/>
               <a:t>F</a:t>
             </a:r>
             <a:r>
-              <a:rPr lang="en-US" dirty="0" smtClean="0"/>
+              <a:rPr lang="en-US" dirty="0"/>
               <a:t>indable</a:t>
             </a:r>
           </a:p>
           <a:p>
             <a:pPr lvl="1"/>
             <a:r>
-              <a:rPr lang="en-US" b="1" dirty="0" smtClean="0"/>
+              <a:rPr lang="en-US" b="1" dirty="0"/>
               <a:t>A</a:t>
             </a:r>
             <a:r>
-              <a:rPr lang="en-US" dirty="0" smtClean="0"/>
+              <a:rPr lang="en-US" dirty="0"/>
               <a:t>ccessible</a:t>
             </a:r>
           </a:p>
           <a:p>
             <a:pPr lvl="1"/>
             <a:r>
-              <a:rPr lang="en-US" b="1" dirty="0" smtClean="0"/>
+              <a:rPr lang="en-US" b="1" dirty="0"/>
               <a:t>I</a:t>
             </a:r>
             <a:r>
-              <a:rPr lang="en-US" dirty="0" smtClean="0"/>
+              <a:rPr lang="en-US" dirty="0"/>
               <a:t>nteroperable</a:t>
             </a:r>
           </a:p>
           <a:p>
             <a:pPr lvl="1"/>
             <a:r>
-              <a:rPr lang="en-US" b="1" dirty="0" smtClean="0"/>
+              <a:rPr lang="en-US" b="1" dirty="0"/>
               <a:t>R</a:t>
             </a:r>
             <a:r>
-              <a:rPr lang="en-US" dirty="0" smtClean="0"/>
+              <a:rPr lang="en-US" dirty="0"/>
               <a:t>eusable</a:t>
             </a:r>
           </a:p>
@@ -6352,7 +6321,7 @@
             <a:pPr marL="457200" lvl="1" indent="0">
               <a:buNone/>
             </a:pPr>
-            <a:endParaRPr lang="en-US" dirty="0" smtClean="0"/>
+            <a:endParaRPr lang="en-US" dirty="0"/>
           </a:p>
           <a:p>
             <a:pPr marL="57150" indent="0">
@@ -6368,7 +6337,6 @@
               <a:rPr lang="en-US" dirty="0"/>
               <a:t> </a:t>
             </a:r>
-            <a:endParaRPr lang="en-US" dirty="0" smtClean="0"/>
           </a:p>
           <a:p>
             <a:endParaRPr lang="en-US" dirty="0"/>
@@ -6445,13 +6413,8 @@
           <a:p>
             <a:r>
               <a:rPr lang="en-US" dirty="0"/>
-              <a:t>FAIR </a:t>
-            </a:r>
-            <a:r>
-              <a:rPr lang="en-US" dirty="0" smtClean="0"/>
-              <a:t>Data - Findable</a:t>
-            </a:r>
-            <a:endParaRPr lang="en-US" dirty="0"/>
+              <a:t>FAIR Data - Findable</a:t>
+            </a:r>
           </a:p>
         </p:txBody>
       </p:sp>
@@ -6472,16 +6435,12 @@
           <a:p>
             <a:pPr lvl="0"/>
             <a:r>
-              <a:rPr lang="en-US" b="1" dirty="0" smtClean="0"/>
+              <a:rPr lang="en-US" b="1" dirty="0"/>
               <a:t>F1.</a:t>
             </a:r>
             <a:r>
-              <a:rPr lang="en-US" dirty="0" smtClean="0"/>
-              <a:t> (Meta</a:t>
-            </a:r>
-            <a:r>
               <a:rPr lang="en-US" dirty="0"/>
-              <a:t>)data are assigned a globally unique and persistent identifier</a:t>
+              <a:t> (Meta)data are assigned a globally unique and persistent identifier</a:t>
             </a:r>
           </a:p>
           <a:p>
@@ -6492,17 +6451,13 @@
             </a:r>
             <a:r>
               <a:rPr lang="en-US" dirty="0"/>
-              <a:t> data are described with rich </a:t>
-            </a:r>
-            <a:r>
-              <a:rPr lang="en-US" dirty="0" smtClean="0"/>
-              <a:t>metadata</a:t>
+              <a:t> data are described with rich metadata</a:t>
             </a:r>
           </a:p>
           <a:p>
             <a:pPr lvl="0"/>
             <a:r>
-              <a:rPr lang="en-US" b="1" dirty="0" smtClean="0">
+              <a:rPr lang="en-US" b="1" dirty="0">
                 <a:solidFill>
                   <a:srgbClr val="008000"/>
                 </a:solidFill>
@@ -6513,21 +6468,16 @@
           <a:p>
             <a:pPr lvl="1"/>
             <a:r>
-              <a:rPr lang="en-US" dirty="0" smtClean="0"/>
+              <a:rPr lang="en-US" dirty="0"/>
               <a:t>Each individual table, field, record has a unique identifier</a:t>
             </a:r>
           </a:p>
           <a:p>
             <a:pPr lvl="1"/>
             <a:r>
-              <a:rPr lang="en-US" dirty="0" smtClean="0"/>
-              <a:t>Each class and property has a unique </a:t>
-            </a:r>
-            <a:r>
-              <a:rPr lang="en-US" dirty="0" err="1" smtClean="0"/>
-              <a:t>identifer</a:t>
-            </a:r>
-            <a:endParaRPr lang="en-US" dirty="0"/>
+              <a:rPr lang="en-US" dirty="0"/>
+              <a:t>Each class and property has a unique identifier</a:t>
+            </a:r>
           </a:p>
           <a:p>
             <a:endParaRPr lang="en-US" dirty="0"/>
@@ -6627,35 +6577,19 @@
             <a:pPr lvl="0"/>
             <a:r>
               <a:rPr lang="en-US" dirty="0"/>
-              <a:t>F3. </a:t>
-            </a:r>
-            <a:r>
-              <a:rPr lang="en-US" dirty="0" smtClean="0"/>
-              <a:t>Metadata </a:t>
-            </a:r>
+              <a:t>F3. Metadata clearly and explicitly include the identifier of the data it describes</a:t>
+            </a:r>
+          </a:p>
+          <a:p>
+            <a:pPr lvl="0"/>
             <a:r>
               <a:rPr lang="en-US" dirty="0"/>
-              <a:t>clearly and explicitly include the identifier of the data it describes</a:t>
-            </a:r>
-          </a:p>
-          <a:p>
-            <a:pPr lvl="0"/>
-            <a:r>
-              <a:rPr lang="en-US" dirty="0"/>
-              <a:t>F4. </a:t>
-            </a:r>
-            <a:r>
-              <a:rPr lang="en-US" dirty="0" smtClean="0"/>
-              <a:t>(Meta</a:t>
-            </a:r>
-            <a:r>
-              <a:rPr lang="en-US" dirty="0"/>
-              <a:t>)data are registered or indexed in a searchable resource</a:t>
-            </a:r>
-          </a:p>
-          <a:p>
-            <a:r>
-              <a:rPr lang="en-US" b="1" dirty="0" smtClean="0">
+              <a:t>F4. (Meta)data are registered or indexed in a searchable resource</a:t>
+            </a:r>
+          </a:p>
+          <a:p>
+            <a:r>
+              <a:rPr lang="en-US" b="1" dirty="0">
                 <a:solidFill>
                   <a:srgbClr val="008000"/>
                 </a:solidFill>
@@ -6666,17 +6600,16 @@
           <a:p>
             <a:pPr lvl="1"/>
             <a:r>
-              <a:rPr lang="en-US" dirty="0" smtClean="0"/>
+              <a:rPr lang="en-US" dirty="0"/>
               <a:t>Individuals are inherently linked to class</a:t>
             </a:r>
           </a:p>
           <a:p>
             <a:pPr lvl="1"/>
             <a:r>
-              <a:rPr lang="en-US" dirty="0" smtClean="0"/>
+              <a:rPr lang="en-US" dirty="0"/>
               <a:t>Metadata can be queried</a:t>
             </a:r>
-            <a:endParaRPr lang="en-US" dirty="0"/>
           </a:p>
         </p:txBody>
       </p:sp>
@@ -6750,13 +6683,8 @@
           <a:p>
             <a:r>
               <a:rPr lang="en-US" dirty="0"/>
-              <a:t>FAIR Data - </a:t>
-            </a:r>
-            <a:r>
-              <a:rPr lang="en-US" dirty="0" smtClean="0"/>
-              <a:t>Accessible</a:t>
-            </a:r>
-            <a:endParaRPr lang="en-US" dirty="0"/>
+              <a:t>FAIR Data - Accessible</a:t>
+            </a:r>
           </a:p>
         </p:txBody>
       </p:sp>
@@ -6782,15 +6710,7 @@
             </a:r>
             <a:r>
               <a:rPr lang="en-US" dirty="0"/>
-              <a:t> </a:t>
-            </a:r>
-            <a:r>
-              <a:rPr lang="en-US" dirty="0" smtClean="0"/>
-              <a:t>(Meta</a:t>
-            </a:r>
-            <a:r>
-              <a:rPr lang="en-US" dirty="0"/>
-              <a:t>)data are retrievable by their identifier using a standardized communications protocol</a:t>
+              <a:t> (Meta)data are retrievable by their identifier using a standardized communications protocol</a:t>
             </a:r>
           </a:p>
           <a:p>
@@ -6806,7 +6726,7 @@
           </a:p>
           <a:p>
             <a:r>
-              <a:rPr lang="en-US" b="1" dirty="0" smtClean="0">
+              <a:rPr lang="en-US" b="1" dirty="0">
                 <a:solidFill>
                   <a:srgbClr val="008000"/>
                 </a:solidFill>
@@ -6817,10 +6737,9 @@
           <a:p>
             <a:pPr lvl="1"/>
             <a:r>
-              <a:rPr lang="en-US" dirty="0" smtClean="0"/>
+              <a:rPr lang="en-US" dirty="0"/>
               <a:t>Ontologies are developed against the background of the Semantic Web. Accessibility is “baked in”.</a:t>
             </a:r>
-            <a:endParaRPr lang="en-US" dirty="0"/>
           </a:p>
         </p:txBody>
       </p:sp>
@@ -6894,13 +6813,8 @@
           <a:p>
             <a:r>
               <a:rPr lang="en-US" dirty="0"/>
-              <a:t>FAIR </a:t>
-            </a:r>
-            <a:r>
-              <a:rPr lang="en-US" dirty="0" smtClean="0"/>
-              <a:t>Data - Interoperable</a:t>
-            </a:r>
-            <a:endParaRPr lang="en-US" dirty="0"/>
+              <a:t>FAIR Data - Interoperable</a:t>
+            </a:r>
           </a:p>
         </p:txBody>
       </p:sp>
@@ -6926,25 +6840,13 @@
             </a:r>
             <a:r>
               <a:rPr lang="en-US" dirty="0"/>
-              <a:t> </a:t>
-            </a:r>
-            <a:r>
-              <a:rPr lang="en-US" dirty="0" smtClean="0"/>
-              <a:t>(Meta</a:t>
-            </a:r>
-            <a:r>
-              <a:rPr lang="en-US" dirty="0"/>
-              <a:t>)data use a formal, accessible, shared, and broadly applicable language for knowledge representation</a:t>
-            </a:r>
-            <a:r>
-              <a:rPr lang="en-US" dirty="0" smtClean="0"/>
-              <a:t>.</a:t>
+              <a:t> (Meta)data use a formal, accessible, shared, and broadly applicable language for knowledge representation.</a:t>
             </a:r>
           </a:p>
           <a:p>
             <a:pPr lvl="0"/>
             <a:r>
-              <a:rPr lang="en-US" b="1" dirty="0" smtClean="0">
+              <a:rPr lang="en-US" b="1" dirty="0">
                 <a:solidFill>
                   <a:srgbClr val="008000"/>
                 </a:solidFill>
@@ -6955,10 +6857,9 @@
           <a:p>
             <a:pPr lvl="1"/>
             <a:r>
-              <a:rPr lang="en-US" dirty="0" smtClean="0"/>
+              <a:rPr lang="en-US" dirty="0"/>
               <a:t>Ontologies are developed using W3 Standards such as OWL, RDF, SPARQL</a:t>
             </a:r>
-            <a:endParaRPr lang="en-US" dirty="0"/>
           </a:p>
         </p:txBody>
       </p:sp>
@@ -7036,10 +6937,9 @@
           <a:lstStyle/>
           <a:p>
             <a:r>
-              <a:rPr lang="en-US" dirty="0" smtClean="0"/>
+              <a:rPr lang="en-US" dirty="0"/>
               <a:t>Data Integration Issues</a:t>
             </a:r>
-            <a:endParaRPr lang="en-US" dirty="0"/>
           </a:p>
         </p:txBody>
       </p:sp>
@@ -7064,7 +6964,7 @@
           <a:lstStyle/>
           <a:p>
             <a:r>
-              <a:rPr lang="en-US" dirty="0" smtClean="0"/>
+              <a:rPr lang="en-US" dirty="0"/>
               <a:t>Different fields and values</a:t>
             </a:r>
           </a:p>
@@ -7156,11 +7056,11 @@
           <a:lstStyle/>
           <a:p>
             <a:r>
-              <a:rPr lang="en-US" sz="2400" b="1" dirty="0" smtClean="0"/>
+              <a:rPr lang="en-US" sz="2400" b="1" dirty="0"/>
               <a:t>Patients 2 table </a:t>
             </a:r>
             <a:r>
-              <a:rPr lang="en-US" sz="2400" b="1" dirty="0" smtClean="0">
+              <a:rPr lang="en-US" sz="2400" b="1" dirty="0">
                 <a:sym typeface="Wingdings"/>
               </a:rPr>
               <a:t></a:t>
@@ -7192,24 +7092,15 @@
           <a:lstStyle/>
           <a:p>
             <a:r>
-              <a:rPr lang="en-US" sz="2400" b="1" dirty="0" smtClean="0">
+              <a:rPr lang="en-US" sz="2400" b="1" dirty="0">
                 <a:sym typeface="Wingdings"/>
               </a:rPr>
               <a:t> </a:t>
             </a:r>
             <a:r>
-              <a:rPr lang="en-US" sz="2400" b="1" dirty="0" smtClean="0"/>
-              <a:t>Patients </a:t>
-            </a:r>
-            <a:r>
               <a:rPr lang="en-US" sz="2400" b="1" dirty="0"/>
-              <a:t>1</a:t>
-            </a:r>
-            <a:r>
-              <a:rPr lang="en-US" sz="2400" b="1" dirty="0" smtClean="0"/>
-              <a:t> table</a:t>
-            </a:r>
-            <a:endParaRPr lang="en-US" sz="2400" b="1" dirty="0"/>
+              <a:t>Patients 1 table</a:t>
+            </a:r>
           </a:p>
         </p:txBody>
       </p:sp>
@@ -7246,13 +7137,6 @@
   <p:clrMapOvr>
     <a:masterClrMapping/>
   </p:clrMapOvr>
-  <p:timing>
-    <p:tnLst>
-      <p:par>
-        <p:cTn xmlns:p14="http://schemas.microsoft.com/office/powerpoint/2010/main" id="1" dur="indefinite" restart="never" nodeType="tmRoot"/>
-      </p:par>
-    </p:tnLst>
-  </p:timing>
 </p:sld>
 </file>
 
@@ -7290,13 +7174,8 @@
           <a:p>
             <a:r>
               <a:rPr lang="en-US" dirty="0"/>
-              <a:t>FAIR </a:t>
-            </a:r>
-            <a:r>
-              <a:rPr lang="en-US" dirty="0" smtClean="0"/>
-              <a:t>Data - Interoperable</a:t>
-            </a:r>
-            <a:endParaRPr lang="en-US" dirty="0"/>
+              <a:t>FAIR Data - Interoperable</a:t>
+            </a:r>
           </a:p>
         </p:txBody>
       </p:sp>
@@ -7337,7 +7216,7 @@
           </a:p>
           <a:p>
             <a:r>
-              <a:rPr lang="en-US" b="1" dirty="0" smtClean="0">
+              <a:rPr lang="en-US" b="1" dirty="0">
                 <a:solidFill>
                   <a:srgbClr val="008000"/>
                 </a:solidFill>
@@ -7348,17 +7227,16 @@
           <a:p>
             <a:pPr lvl="1"/>
             <a:r>
-              <a:rPr lang="en-US" dirty="0" smtClean="0"/>
+              <a:rPr lang="en-US" dirty="0"/>
               <a:t>Ontologies can easily import other ontologies that follow FAIR principles</a:t>
             </a:r>
           </a:p>
           <a:p>
             <a:pPr lvl="1"/>
             <a:r>
-              <a:rPr lang="en-US" dirty="0" smtClean="0"/>
+              <a:rPr lang="en-US" dirty="0"/>
               <a:t>Imported ontologies can be easily reused</a:t>
             </a:r>
-            <a:endParaRPr lang="en-US" dirty="0"/>
           </a:p>
         </p:txBody>
       </p:sp>
@@ -7432,13 +7310,8 @@
           <a:p>
             <a:r>
               <a:rPr lang="en-US" dirty="0"/>
-              <a:t>FAIR </a:t>
-            </a:r>
-            <a:r>
-              <a:rPr lang="en-US" dirty="0" smtClean="0"/>
-              <a:t>Data - Reusable</a:t>
-            </a:r>
-            <a:endParaRPr lang="en-US" dirty="0"/>
+              <a:t>FAIR Data - Reusable</a:t>
+            </a:r>
           </a:p>
         </p:txBody>
       </p:sp>
@@ -7471,15 +7344,7 @@
             </a:r>
             <a:r>
               <a:rPr lang="en-US" dirty="0"/>
-              <a:t> </a:t>
-            </a:r>
-            <a:r>
-              <a:rPr lang="en-US" dirty="0" smtClean="0"/>
-              <a:t>(Meta)data </a:t>
-            </a:r>
-            <a:r>
-              <a:rPr lang="en-US" dirty="0"/>
-              <a:t>are richly described with a plurality of accurate and relevant attributes</a:t>
+              <a:t> (Meta)data are richly described with a plurality of accurate and relevant attributes</a:t>
             </a:r>
           </a:p>
           <a:p>
@@ -7490,20 +7355,12 @@
             </a:r>
             <a:r>
               <a:rPr lang="en-US" dirty="0"/>
-              <a:t> </a:t>
-            </a:r>
-            <a:r>
-              <a:rPr lang="en-US" dirty="0" smtClean="0"/>
-              <a:t>(Meta</a:t>
-            </a:r>
-            <a:r>
-              <a:rPr lang="en-US" dirty="0"/>
-              <a:t>)data are released with a clear and accessible data usage license</a:t>
-            </a:r>
-          </a:p>
-          <a:p>
-            <a:r>
-              <a:rPr lang="en-US" b="1" dirty="0" smtClean="0">
+              <a:t> (Meta)data are released with a clear and accessible data usage license</a:t>
+            </a:r>
+          </a:p>
+          <a:p>
+            <a:r>
+              <a:rPr lang="en-US" b="1" dirty="0">
                 <a:solidFill>
                   <a:srgbClr val="008000"/>
                 </a:solidFill>
@@ -7514,14 +7371,14 @@
           <a:p>
             <a:pPr lvl="1"/>
             <a:r>
-              <a:rPr lang="en-US" dirty="0" smtClean="0"/>
+              <a:rPr lang="en-US" dirty="0"/>
               <a:t>Entities are easily linked together and annotated using properties</a:t>
             </a:r>
           </a:p>
           <a:p>
             <a:pPr lvl="1"/>
             <a:r>
-              <a:rPr lang="en-US" dirty="0" smtClean="0"/>
+              <a:rPr lang="en-US" dirty="0"/>
               <a:t>Licenses can be assigned to an ontology (e.g., </a:t>
             </a:r>
             <a:r>
@@ -7532,23 +7389,18 @@
             </a:r>
             <a:r>
               <a:rPr lang="en-US" dirty="0"/>
-              <a:t> </a:t>
-            </a:r>
-            <a:r>
-              <a:rPr lang="en-US" dirty="0" smtClean="0"/>
-              <a:t>specifies </a:t>
-            </a:r>
-            <a:r>
-              <a:rPr lang="en-US" dirty="0" smtClean="0">
+              <a:t> specifies </a:t>
+            </a:r>
+            <a:r>
+              <a:rPr lang="en-US" dirty="0">
                 <a:hlinkClick r:id="rId3"/>
               </a:rPr>
               <a:t>creative commons 4.0</a:t>
             </a:r>
             <a:r>
-              <a:rPr lang="en-US" dirty="0" smtClean="0"/>
+              <a:rPr lang="en-US" dirty="0"/>
               <a:t>)</a:t>
             </a:r>
-            <a:endParaRPr lang="en-US" dirty="0"/>
           </a:p>
         </p:txBody>
       </p:sp>
@@ -7622,13 +7474,8 @@
           <a:p>
             <a:r>
               <a:rPr lang="en-US" dirty="0"/>
-              <a:t>FAIR </a:t>
-            </a:r>
-            <a:r>
-              <a:rPr lang="en-US" dirty="0" smtClean="0"/>
-              <a:t>Data - Reusable</a:t>
-            </a:r>
-            <a:endParaRPr lang="en-US" dirty="0"/>
+              <a:t>FAIR Data - Reusable</a:t>
+            </a:r>
           </a:p>
         </p:txBody>
       </p:sp>
@@ -7661,15 +7508,7 @@
             </a:r>
             <a:r>
               <a:rPr lang="en-US" dirty="0"/>
-              <a:t> </a:t>
-            </a:r>
-            <a:r>
-              <a:rPr lang="en-US" dirty="0" smtClean="0"/>
-              <a:t>(Meta</a:t>
-            </a:r>
-            <a:r>
-              <a:rPr lang="en-US" dirty="0"/>
-              <a:t>)data are associated with detailed provenance</a:t>
+              <a:t> (Meta)data are associated with detailed provenance</a:t>
             </a:r>
           </a:p>
           <a:p>
@@ -7680,25 +7519,13 @@
             </a:r>
             <a:r>
               <a:rPr lang="en-US" dirty="0"/>
-              <a:t> </a:t>
-            </a:r>
-            <a:r>
-              <a:rPr lang="en-US" dirty="0" smtClean="0"/>
-              <a:t>(Meta</a:t>
-            </a:r>
-            <a:r>
-              <a:rPr lang="en-US" dirty="0"/>
-              <a:t>)data meet domain-relevant community </a:t>
-            </a:r>
-            <a:r>
-              <a:rPr lang="en-US" dirty="0" smtClean="0"/>
-              <a:t>standards</a:t>
+              <a:t> (Meta)data meet domain-relevant community standards</a:t>
             </a:r>
           </a:p>
           <a:p>
             <a:pPr lvl="0"/>
             <a:r>
-              <a:rPr lang="en-US" b="1" dirty="0" smtClean="0">
+              <a:rPr lang="en-US" b="1" dirty="0">
                 <a:solidFill>
                   <a:srgbClr val="008000"/>
                 </a:solidFill>
@@ -7709,27 +7536,26 @@
           <a:p>
             <a:pPr lvl="1"/>
             <a:r>
-              <a:rPr lang="en-US" dirty="0" smtClean="0"/>
+              <a:rPr lang="en-US" dirty="0"/>
               <a:t> Annotations allow you to easily add who, when, or whey an entity was created. Can be linked to provenance standards, such as the </a:t>
             </a:r>
             <a:r>
-              <a:rPr lang="en-US" dirty="0" smtClean="0">
+              <a:rPr lang="en-US" dirty="0">
                 <a:hlinkClick r:id="rId2"/>
               </a:rPr>
               <a:t>PROV Ontology</a:t>
             </a:r>
             <a:r>
-              <a:rPr lang="en-US" dirty="0" smtClean="0"/>
+              <a:rPr lang="en-US" dirty="0"/>
               <a:t>.</a:t>
             </a:r>
           </a:p>
           <a:p>
             <a:pPr lvl="1"/>
             <a:r>
-              <a:rPr lang="en-US" dirty="0" smtClean="0"/>
+              <a:rPr lang="en-US" dirty="0"/>
               <a:t>Developed using shared principles (e.g., OBO Foundry, SNOMED).</a:t>
             </a:r>
-            <a:endParaRPr lang="en-US" dirty="0"/>
           </a:p>
         </p:txBody>
       </p:sp>
@@ -7812,7 +7638,7 @@
               <a:buNone/>
             </a:pPr>
             <a:r>
-              <a:rPr lang="en-US" sz="4800" b="1" dirty="0" smtClean="0">
+              <a:rPr lang="en-US" sz="4800" b="1" dirty="0">
                 <a:solidFill>
                   <a:srgbClr val="0000FF"/>
                 </a:solidFill>
@@ -7831,18 +7657,13 @@
               <a:buNone/>
             </a:pPr>
             <a:r>
-              <a:rPr lang="en-US" sz="4800" b="1" dirty="0" smtClean="0">
+              <a:rPr lang="en-US" sz="4800" b="1" dirty="0">
                 <a:solidFill>
                   <a:srgbClr val="0000FF"/>
                 </a:solidFill>
               </a:rPr>
               <a:t>Questions/Comments?</a:t>
             </a:r>
-            <a:endParaRPr lang="en-US" sz="4800" b="1" dirty="0">
-              <a:solidFill>
-                <a:srgbClr val="0000FF"/>
-              </a:solidFill>
-            </a:endParaRPr>
           </a:p>
         </p:txBody>
       </p:sp>
@@ -7920,10 +7741,9 @@
           <a:lstStyle/>
           <a:p>
             <a:r>
-              <a:rPr lang="en-US" dirty="0" smtClean="0"/>
+              <a:rPr lang="en-US" dirty="0"/>
               <a:t>Data Integration Issues</a:t>
             </a:r>
-            <a:endParaRPr lang="en-US" dirty="0"/>
           </a:p>
         </p:txBody>
       </p:sp>
@@ -7948,14 +7768,14 @@
           <a:lstStyle/>
           <a:p>
             <a:r>
-              <a:rPr lang="en-US" dirty="0" smtClean="0"/>
+              <a:rPr lang="en-US" dirty="0"/>
               <a:t>Ambiguity: </a:t>
             </a:r>
           </a:p>
           <a:p>
             <a:pPr lvl="1"/>
             <a:r>
-              <a:rPr lang="en-US" dirty="0" smtClean="0"/>
+              <a:rPr lang="en-US" dirty="0"/>
               <a:t>Does ‘sex’ mean gender or biological sex?</a:t>
             </a:r>
           </a:p>
@@ -8027,13 +7847,6 @@
   <p:clrMapOvr>
     <a:masterClrMapping/>
   </p:clrMapOvr>
-  <p:timing>
-    <p:tnLst>
-      <p:par>
-        <p:cTn xmlns:p14="http://schemas.microsoft.com/office/powerpoint/2010/main" id="1" dur="indefinite" restart="never" nodeType="tmRoot"/>
-      </p:par>
-    </p:tnLst>
-  </p:timing>
 </p:sld>
 </file>
 
@@ -8070,10 +7883,9 @@
           <a:lstStyle/>
           <a:p>
             <a:r>
-              <a:rPr lang="en-US" dirty="0" smtClean="0"/>
+              <a:rPr lang="en-US" dirty="0"/>
               <a:t>Data Integration Issues</a:t>
             </a:r>
-            <a:endParaRPr lang="en-US" dirty="0"/>
           </a:p>
         </p:txBody>
       </p:sp>
@@ -8093,10 +7905,9 @@
           <a:lstStyle/>
           <a:p>
             <a:r>
-              <a:rPr lang="en-US" dirty="0" smtClean="0"/>
+              <a:rPr lang="en-US" dirty="0"/>
               <a:t>Structural complexity </a:t>
             </a:r>
-            <a:endParaRPr lang="en-US" dirty="0"/>
           </a:p>
         </p:txBody>
       </p:sp>
@@ -8531,10 +8342,9 @@
           <a:lstStyle/>
           <a:p>
             <a:r>
-              <a:rPr lang="en-US" dirty="0" smtClean="0"/>
+              <a:rPr lang="en-US" dirty="0"/>
               <a:t>Data Integration Issues</a:t>
             </a:r>
-            <a:endParaRPr lang="en-US" dirty="0"/>
           </a:p>
         </p:txBody>
       </p:sp>
@@ -8554,42 +8364,42 @@
           <a:lstStyle/>
           <a:p>
             <a:r>
-              <a:rPr lang="en-US" dirty="0" smtClean="0"/>
+              <a:rPr lang="en-US" dirty="0"/>
               <a:t>Other important issues</a:t>
             </a:r>
           </a:p>
           <a:p>
             <a:pPr lvl="1"/>
             <a:r>
-              <a:rPr lang="en-US" dirty="0" smtClean="0"/>
+              <a:rPr lang="en-US" dirty="0"/>
               <a:t>Schema type (normalized vs. non-normalized)</a:t>
             </a:r>
           </a:p>
           <a:p>
             <a:pPr lvl="1"/>
             <a:r>
-              <a:rPr lang="en-US" dirty="0" smtClean="0"/>
+              <a:rPr lang="en-US" dirty="0"/>
               <a:t>Indexing</a:t>
             </a:r>
           </a:p>
           <a:p>
             <a:pPr lvl="1"/>
             <a:r>
-              <a:rPr lang="en-US" dirty="0" smtClean="0"/>
+              <a:rPr lang="en-US" dirty="0"/>
               <a:t>Federation across multiple database</a:t>
             </a:r>
           </a:p>
           <a:p>
             <a:pPr lvl="1"/>
             <a:r>
-              <a:rPr lang="en-US" dirty="0" smtClean="0"/>
+              <a:rPr lang="en-US" dirty="0"/>
               <a:t>Flavors of SQL</a:t>
             </a:r>
           </a:p>
           <a:p>
             <a:pPr lvl="1"/>
             <a:r>
-              <a:rPr lang="en-US" dirty="0" smtClean="0"/>
+              <a:rPr lang="en-US" dirty="0"/>
               <a:t>Provenance</a:t>
             </a:r>
           </a:p>
@@ -8664,10 +8474,9 @@
           <a:lstStyle/>
           <a:p>
             <a:r>
-              <a:rPr lang="en-US" dirty="0" smtClean="0"/>
+              <a:rPr lang="en-US" dirty="0"/>
               <a:t>Data as Graph</a:t>
             </a:r>
-            <a:endParaRPr lang="en-US" dirty="0"/>
           </a:p>
         </p:txBody>
       </p:sp>
@@ -8772,10 +8581,9 @@
           <a:lstStyle/>
           <a:p>
             <a:r>
-              <a:rPr lang="en-US" dirty="0" smtClean="0"/>
+              <a:rPr lang="en-US" dirty="0"/>
               <a:t>Data as Graph</a:t>
             </a:r>
-            <a:endParaRPr lang="en-US" dirty="0"/>
           </a:p>
         </p:txBody>
       </p:sp>
@@ -8908,10 +8716,9 @@
           <a:lstStyle/>
           <a:p>
             <a:r>
-              <a:rPr lang="en-US" dirty="0" smtClean="0"/>
+              <a:rPr lang="en-US" dirty="0"/>
               <a:t>Data as Graph</a:t>
             </a:r>
-            <a:endParaRPr lang="en-US" dirty="0"/>
           </a:p>
         </p:txBody>
       </p:sp>

</xml_diff>